<commit_message>
KAN 05 neue Lizenzen eingepflegt
</commit_message>
<xml_diff>
--- a/training-cards/music moves/Kanban (KAN)/ger_KAN_05_Tempotabelle_MM_A.pptx
+++ b/training-cards/music moves/Kanban (KAN)/ger_KAN_05_Tempotabelle_MM_A.pptx
@@ -212,7 +212,7 @@
           <a:p>
             <a:fld id="{10F8DC5B-5F6F-B341-A0E1-3C37FC6B86DA}" type="datetimeFigureOut">
               <a:rPr lang="de-DE" smtClean="0"/>
-              <a:t>23.02.16</a:t>
+              <a:t>23.07.23</a:t>
             </a:fld>
             <a:endParaRPr lang="de-DE"/>
           </a:p>
@@ -340,10 +340,9 @@
           </a:lstStyle>
           <a:p>
             <a:r>
-              <a:rPr lang="de-DE" dirty="0" smtClean="0"/>
+              <a:rPr lang="de-DE" dirty="0"/>
               <a:t>TITEL HINZUFÜGEN</a:t>
             </a:r>
-            <a:endParaRPr lang="de-DE" dirty="0"/>
           </a:p>
         </p:txBody>
       </p:sp>
@@ -374,35 +373,35 @@
           <a:p>
             <a:pPr lvl="0"/>
             <a:r>
-              <a:rPr lang="de-DE" smtClean="0"/>
+              <a:rPr lang="de-DE"/>
               <a:t>Mastertextformat bearbeiten</a:t>
             </a:r>
           </a:p>
           <a:p>
             <a:pPr lvl="1"/>
             <a:r>
-              <a:rPr lang="de-DE" smtClean="0"/>
+              <a:rPr lang="de-DE"/>
               <a:t>Zweite Ebene</a:t>
             </a:r>
           </a:p>
           <a:p>
             <a:pPr lvl="2"/>
             <a:r>
-              <a:rPr lang="de-DE" smtClean="0"/>
+              <a:rPr lang="de-DE"/>
               <a:t>Dritte Ebene</a:t>
             </a:r>
           </a:p>
           <a:p>
             <a:pPr lvl="3"/>
             <a:r>
-              <a:rPr lang="de-DE" smtClean="0"/>
+              <a:rPr lang="de-DE"/>
               <a:t>Vierte Ebene</a:t>
             </a:r>
           </a:p>
           <a:p>
             <a:pPr lvl="4"/>
             <a:r>
-              <a:rPr lang="de-DE" smtClean="0"/>
+              <a:rPr lang="de-DE"/>
               <a:t>Fünfte Ebene</a:t>
             </a:r>
             <a:endParaRPr lang="de-DE" dirty="0"/>
@@ -449,7 +448,7 @@
               <a:buNone/>
             </a:pPr>
             <a:r>
-              <a:rPr lang="de-DE" smtClean="0"/>
+              <a:rPr lang="de-DE"/>
               <a:t>Master-Untertitelformat bearbeiten</a:t>
             </a:r>
             <a:endParaRPr lang="de-DE" dirty="0"/>
@@ -565,35 +564,35 @@
           <a:p>
             <a:pPr lvl="0"/>
             <a:r>
-              <a:rPr lang="de-DE" smtClean="0"/>
+              <a:rPr lang="de-DE"/>
               <a:t>Mastertextformat bearbeiten</a:t>
             </a:r>
           </a:p>
           <a:p>
             <a:pPr lvl="1"/>
             <a:r>
-              <a:rPr lang="de-DE" smtClean="0"/>
+              <a:rPr lang="de-DE"/>
               <a:t>Zweite Ebene</a:t>
             </a:r>
           </a:p>
           <a:p>
             <a:pPr lvl="2"/>
             <a:r>
-              <a:rPr lang="de-DE" smtClean="0"/>
+              <a:rPr lang="de-DE"/>
               <a:t>Dritte Ebene</a:t>
             </a:r>
           </a:p>
           <a:p>
             <a:pPr lvl="3"/>
             <a:r>
-              <a:rPr lang="de-DE" smtClean="0"/>
+              <a:rPr lang="de-DE"/>
               <a:t>Vierte Ebene</a:t>
             </a:r>
           </a:p>
           <a:p>
             <a:pPr lvl="4"/>
             <a:r>
-              <a:rPr lang="de-DE" smtClean="0"/>
+              <a:rPr lang="de-DE"/>
               <a:t>Fünfte Ebene</a:t>
             </a:r>
             <a:endParaRPr lang="de-DE" dirty="0"/>
@@ -623,7 +622,7 @@
           <a:lstStyle/>
           <a:p>
             <a:r>
-              <a:rPr lang="de-DE" sz="2400" dirty="0" smtClean="0">
+              <a:rPr lang="de-DE" sz="2400" dirty="0">
                 <a:solidFill>
                   <a:srgbClr val="7E006B"/>
                 </a:solidFill>
@@ -633,7 +632,7 @@
               <a:t>TRAININGS</a:t>
             </a:r>
             <a:r>
-              <a:rPr lang="de-DE" sz="2400" dirty="0" smtClean="0">
+              <a:rPr lang="de-DE" sz="2400" dirty="0">
                 <a:solidFill>
                   <a:srgbClr val="7E006B"/>
                 </a:solidFill>
@@ -684,14 +683,20 @@
       </p:pic>
       <p:sp>
         <p:nvSpPr>
-          <p:cNvPr id="5" name="Shape 7"/>
+          <p:cNvPr id="4" name="Shape 7">
+            <a:extLst>
+              <a:ext uri="{FF2B5EF4-FFF2-40B4-BE49-F238E27FC236}">
+                <a16:creationId xmlns:a16="http://schemas.microsoft.com/office/drawing/2014/main" id="{81EAEFD4-254D-DB7A-E3CC-6ADBD074C9B3}"/>
+              </a:ext>
+            </a:extLst>
+          </p:cNvPr>
           <p:cNvSpPr/>
           <p:nvPr userDrawn="1"/>
         </p:nvSpPr>
         <p:spPr>
           <a:xfrm>
-            <a:off x="1683417" y="4952581"/>
-            <a:ext cx="4196016" cy="276995"/>
+            <a:off x="971550" y="4689585"/>
+            <a:ext cx="4691860" cy="461661"/>
           </a:xfrm>
           <a:prstGeom prst="rect">
             <a:avLst/>
@@ -701,12 +706,12 @@
           </a:ln>
           <a:extLst>
             <a:ext uri="{C572A759-6A51-4108-AA02-DFA0A04FC94B}">
-              <ma14:wrappingTextBoxFlag xmlns:ma14="http://schemas.microsoft.com/office/mac/drawingml/2011/main" val="1"/>
+              <ma14:wrappingTextBoxFlag xmlns="" xmlns:ma14="http://schemas.microsoft.com/office/mac/drawingml/2011/main" val="1"/>
             </a:ext>
           </a:extLst>
         </p:spPr>
         <p:txBody>
-          <a:bodyPr wrap="none" lIns="45718" tIns="45718" rIns="45718" bIns="45718">
+          <a:bodyPr wrap="square" lIns="45718" tIns="45718" rIns="45718" bIns="45718">
             <a:spAutoFit/>
           </a:bodyPr>
           <a:lstStyle/>
@@ -715,49 +720,266 @@
               <a:defRPr sz="1800"/>
             </a:pPr>
             <a:r>
-              <a:rPr sz="600" dirty="0">
-                <a:latin typeface="Avenir Light"/>
+              <a:rPr lang="de-DE" sz="800" b="0" i="0" u="none" strike="noStrike" dirty="0" err="1">
+                <a:solidFill>
+                  <a:schemeClr val="tx1">
+                    <a:lumMod val="65000"/>
+                    <a:lumOff val="35000"/>
+                  </a:schemeClr>
+                </a:solidFill>
+                <a:effectLst/>
+                <a:latin typeface="Avenir Book" panose="02000503020000020003" pitchFamily="2" charset="0"/>
+              </a:rPr>
+              <a:t>music</a:t>
+            </a:r>
+            <a:r>
+              <a:rPr lang="de-DE" sz="800" b="0" i="0" u="none" strike="noStrike" dirty="0">
+                <a:solidFill>
+                  <a:schemeClr val="tx1">
+                    <a:lumMod val="65000"/>
+                    <a:lumOff val="35000"/>
+                  </a:schemeClr>
+                </a:solidFill>
+                <a:effectLst/>
+                <a:latin typeface="Avenir Book" panose="02000503020000020003" pitchFamily="2" charset="0"/>
+              </a:rPr>
+              <a:t> </a:t>
+            </a:r>
+            <a:r>
+              <a:rPr lang="de-DE" sz="800" b="0" i="0" u="none" strike="noStrike" dirty="0" err="1">
+                <a:solidFill>
+                  <a:schemeClr val="tx1">
+                    <a:lumMod val="65000"/>
+                    <a:lumOff val="35000"/>
+                  </a:schemeClr>
+                </a:solidFill>
+                <a:effectLst/>
+                <a:latin typeface="Avenir Book" panose="02000503020000020003" pitchFamily="2" charset="0"/>
+              </a:rPr>
+              <a:t>moves</a:t>
+            </a:r>
+            <a:r>
+              <a:rPr lang="de-DE" sz="800" b="0" i="0" u="none" strike="noStrike" dirty="0">
+                <a:solidFill>
+                  <a:schemeClr val="tx1">
+                    <a:lumMod val="65000"/>
+                    <a:lumOff val="35000"/>
+                  </a:schemeClr>
+                </a:solidFill>
+                <a:effectLst/>
+                <a:latin typeface="Avenir Book" panose="02000503020000020003" pitchFamily="2" charset="0"/>
+              </a:rPr>
+              <a:t>-Trainingskarten von Regina Brandhuber sind lizenziert unter einer Creative Commons </a:t>
+            </a:r>
+          </a:p>
+          <a:p>
+            <a:pPr lvl="0" algn="ctr">
+              <a:defRPr sz="1800"/>
+            </a:pPr>
+            <a:r>
+              <a:rPr lang="de-DE" sz="800" b="0" i="0" u="none" strike="noStrike" dirty="0">
+                <a:solidFill>
+                  <a:schemeClr val="tx1">
+                    <a:lumMod val="65000"/>
+                    <a:lumOff val="35000"/>
+                  </a:schemeClr>
+                </a:solidFill>
+                <a:effectLst/>
+                <a:latin typeface="Avenir Book" panose="02000503020000020003" pitchFamily="2" charset="0"/>
+              </a:rPr>
+              <a:t>Namensnennung-Nicht kommerziell 4.0 International Lizenz.</a:t>
+            </a:r>
+          </a:p>
+          <a:p>
+            <a:pPr lvl="0" algn="ctr">
+              <a:defRPr sz="1800"/>
+            </a:pPr>
+            <a:r>
+              <a:rPr lang="de-DE" sz="800" dirty="0">
+                <a:solidFill>
+                  <a:schemeClr val="tx1">
+                    <a:lumMod val="65000"/>
+                    <a:lumOff val="35000"/>
+                  </a:schemeClr>
+                </a:solidFill>
+                <a:latin typeface="Avenir Book" panose="02000503020000020003" pitchFamily="2" charset="0"/>
                 <a:ea typeface="Calibri"/>
                 <a:cs typeface="Avenir Light"/>
                 <a:sym typeface="Calibri"/>
               </a:rPr>
-              <a:t>This work is licensed under the Creative Commons Attribution-NonCommercial-NoDerivatives 4.0 International License. </a:t>
-            </a:r>
-          </a:p>
-          <a:p>
-            <a:pPr lvl="0" algn="ctr">
-              <a:defRPr sz="1800"/>
-            </a:pPr>
-            <a:r>
-              <a:rPr sz="600" dirty="0">
-                <a:latin typeface="Avenir Light"/>
+              <a:t>Nachzulesen unter:</a:t>
+            </a:r>
+            <a:r>
+              <a:rPr sz="800" dirty="0">
+                <a:solidFill>
+                  <a:schemeClr val="tx1">
+                    <a:lumMod val="65000"/>
+                    <a:lumOff val="35000"/>
+                  </a:schemeClr>
+                </a:solidFill>
+                <a:latin typeface="Avenir Book" panose="02000503020000020003" pitchFamily="2" charset="0"/>
                 <a:ea typeface="Calibri"/>
                 <a:cs typeface="Avenir Light"/>
                 <a:sym typeface="Calibri"/>
               </a:rPr>
-              <a:t>To view a copy of this license, visit http://creativecommons.org/licenses/by-nc-nd/4.0/.</a:t>
-            </a:r>
+              <a:t> </a:t>
+            </a:r>
+            <a:r>
+              <a:rPr lang="de-DE" sz="800" dirty="0">
+                <a:solidFill>
+                  <a:schemeClr val="tx1">
+                    <a:lumMod val="65000"/>
+                    <a:lumOff val="35000"/>
+                  </a:schemeClr>
+                </a:solidFill>
+                <a:latin typeface="Avenir Book" panose="02000503020000020003" pitchFamily="2" charset="0"/>
+                <a:ea typeface="Calibri"/>
+                <a:cs typeface="Avenir Light"/>
+                <a:sym typeface="Calibri"/>
+              </a:rPr>
+              <a:t>https://</a:t>
+            </a:r>
+            <a:r>
+              <a:rPr lang="de-DE" sz="800" dirty="0" err="1">
+                <a:solidFill>
+                  <a:schemeClr val="tx1">
+                    <a:lumMod val="65000"/>
+                    <a:lumOff val="35000"/>
+                  </a:schemeClr>
+                </a:solidFill>
+                <a:latin typeface="Avenir Book" panose="02000503020000020003" pitchFamily="2" charset="0"/>
+                <a:ea typeface="Calibri"/>
+                <a:cs typeface="Avenir Light"/>
+                <a:sym typeface="Calibri"/>
+              </a:rPr>
+              <a:t>creativecommons.org</a:t>
+            </a:r>
+            <a:r>
+              <a:rPr lang="de-DE" sz="800" dirty="0">
+                <a:solidFill>
+                  <a:schemeClr val="tx1">
+                    <a:lumMod val="65000"/>
+                    <a:lumOff val="35000"/>
+                  </a:schemeClr>
+                </a:solidFill>
+                <a:latin typeface="Avenir Book" panose="02000503020000020003" pitchFamily="2" charset="0"/>
+                <a:ea typeface="Calibri"/>
+                <a:cs typeface="Avenir Light"/>
+                <a:sym typeface="Calibri"/>
+              </a:rPr>
+              <a:t>/</a:t>
+            </a:r>
+            <a:r>
+              <a:rPr lang="de-DE" sz="800" dirty="0" err="1">
+                <a:solidFill>
+                  <a:schemeClr val="tx1">
+                    <a:lumMod val="65000"/>
+                    <a:lumOff val="35000"/>
+                  </a:schemeClr>
+                </a:solidFill>
+                <a:latin typeface="Avenir Book" panose="02000503020000020003" pitchFamily="2" charset="0"/>
+                <a:ea typeface="Calibri"/>
+                <a:cs typeface="Avenir Light"/>
+                <a:sym typeface="Calibri"/>
+              </a:rPr>
+              <a:t>licenses</a:t>
+            </a:r>
+            <a:r>
+              <a:rPr lang="de-DE" sz="800" dirty="0">
+                <a:solidFill>
+                  <a:schemeClr val="tx1">
+                    <a:lumMod val="65000"/>
+                    <a:lumOff val="35000"/>
+                  </a:schemeClr>
+                </a:solidFill>
+                <a:latin typeface="Avenir Book" panose="02000503020000020003" pitchFamily="2" charset="0"/>
+                <a:ea typeface="Calibri"/>
+                <a:cs typeface="Avenir Light"/>
+                <a:sym typeface="Calibri"/>
+              </a:rPr>
+              <a:t>/</a:t>
+            </a:r>
+            <a:r>
+              <a:rPr lang="de-DE" sz="800" dirty="0" err="1">
+                <a:solidFill>
+                  <a:schemeClr val="tx1">
+                    <a:lumMod val="65000"/>
+                    <a:lumOff val="35000"/>
+                  </a:schemeClr>
+                </a:solidFill>
+                <a:latin typeface="Avenir Book" panose="02000503020000020003" pitchFamily="2" charset="0"/>
+                <a:ea typeface="Calibri"/>
+                <a:cs typeface="Avenir Light"/>
+                <a:sym typeface="Calibri"/>
+              </a:rPr>
+              <a:t>by-nc</a:t>
+            </a:r>
+            <a:r>
+              <a:rPr lang="de-DE" sz="800" dirty="0">
+                <a:solidFill>
+                  <a:schemeClr val="tx1">
+                    <a:lumMod val="65000"/>
+                    <a:lumOff val="35000"/>
+                  </a:schemeClr>
+                </a:solidFill>
+                <a:latin typeface="Avenir Book" panose="02000503020000020003" pitchFamily="2" charset="0"/>
+                <a:ea typeface="Calibri"/>
+                <a:cs typeface="Avenir Light"/>
+                <a:sym typeface="Calibri"/>
+              </a:rPr>
+              <a:t>/4.0/</a:t>
+            </a:r>
+            <a:r>
+              <a:rPr lang="de-DE" sz="800" dirty="0" err="1">
+                <a:solidFill>
+                  <a:schemeClr val="tx1">
+                    <a:lumMod val="65000"/>
+                    <a:lumOff val="35000"/>
+                  </a:schemeClr>
+                </a:solidFill>
+                <a:latin typeface="Avenir Book" panose="02000503020000020003" pitchFamily="2" charset="0"/>
+                <a:ea typeface="Calibri"/>
+                <a:cs typeface="Avenir Light"/>
+                <a:sym typeface="Calibri"/>
+              </a:rPr>
+              <a:t>deed.de</a:t>
+            </a:r>
+            <a:endParaRPr sz="800" dirty="0">
+              <a:solidFill>
+                <a:schemeClr val="tx1">
+                  <a:lumMod val="65000"/>
+                  <a:lumOff val="35000"/>
+                </a:schemeClr>
+              </a:solidFill>
+              <a:latin typeface="Avenir Book" panose="02000503020000020003" pitchFamily="2" charset="0"/>
+              <a:ea typeface="Calibri"/>
+              <a:cs typeface="Avenir Light"/>
+              <a:sym typeface="Calibri"/>
+            </a:endParaRPr>
           </a:p>
         </p:txBody>
       </p:sp>
       <p:pic>
         <p:nvPicPr>
-          <p:cNvPr id="6" name="pasted-image.tif"/>
+          <p:cNvPr id="8" name="pasted-image.tif">
+            <a:extLst>
+              <a:ext uri="{FF2B5EF4-FFF2-40B4-BE49-F238E27FC236}">
+                <a16:creationId xmlns:a16="http://schemas.microsoft.com/office/drawing/2014/main" id="{5C0B1BB7-CE79-72FB-F5AC-C2BEB37EF946}"/>
+              </a:ext>
+            </a:extLst>
+          </p:cNvPr>
           <p:cNvPicPr/>
           <p:nvPr userDrawn="1"/>
         </p:nvPicPr>
-        <p:blipFill>
-          <a:blip r:embed="rId4">
-            <a:extLst/>
-          </a:blip>
-          <a:stretch>
-            <a:fillRect/>
-          </a:stretch>
+        <p:blipFill rotWithShape="1">
+          <a:blip r:embed="rId4"/>
+          <a:srcRect r="24777" b="-3233"/>
+          <a:stretch/>
         </p:blipFill>
         <p:spPr>
           <a:xfrm>
-            <a:off x="6174185" y="4992838"/>
-            <a:ext cx="886619" cy="214128"/>
+            <a:off x="5724347" y="4733926"/>
+            <a:ext cx="1009828" cy="333374"/>
           </a:xfrm>
           <a:prstGeom prst="rect">
             <a:avLst/>
@@ -767,58 +989,6 @@
           </a:ln>
         </p:spPr>
       </p:pic>
-      <p:sp>
-        <p:nvSpPr>
-          <p:cNvPr id="7" name="Textfeld 6"/>
-          <p:cNvSpPr txBox="1"/>
-          <p:nvPr userDrawn="1"/>
-        </p:nvSpPr>
-        <p:spPr>
-          <a:xfrm>
-            <a:off x="239285" y="4936890"/>
-            <a:ext cx="1044856" cy="276999"/>
-          </a:xfrm>
-          <a:prstGeom prst="rect">
-            <a:avLst/>
-          </a:prstGeom>
-          <a:noFill/>
-        </p:spPr>
-        <p:txBody>
-          <a:bodyPr wrap="square" rtlCol="0">
-            <a:spAutoFit/>
-          </a:bodyPr>
-          <a:lstStyle/>
-          <a:p>
-            <a:r>
-              <a:rPr lang="de-DE" sz="600" dirty="0">
-                <a:solidFill>
-                  <a:srgbClr val="5D5E5F"/>
-                </a:solidFill>
-                <a:latin typeface="Avenir Light"/>
-                <a:cs typeface="Avenir Light"/>
-              </a:rPr>
-              <a:t>Letzte Änderung: </a:t>
-            </a:r>
-            <a:fld id="{7A8C7DAC-E536-564C-B5B3-90E8FAB50562}" type="datetime1">
-              <a:rPr lang="de-DE" sz="600" smtClean="0">
-                <a:solidFill>
-                  <a:srgbClr val="5D5E5F"/>
-                </a:solidFill>
-                <a:latin typeface="Avenir Light"/>
-                <a:cs typeface="Avenir Light"/>
-              </a:rPr>
-              <a:t>23.02.16</a:t>
-            </a:fld>
-            <a:endParaRPr lang="de-DE" sz="600" dirty="0">
-              <a:solidFill>
-                <a:srgbClr val="5D5E5F"/>
-              </a:solidFill>
-              <a:latin typeface="Avenir Light"/>
-              <a:cs typeface="Avenir Light"/>
-            </a:endParaRPr>
-          </a:p>
-        </p:txBody>
-      </p:sp>
     </p:spTree>
     <p:extLst>
       <p:ext uri="{BB962C8B-B14F-4D97-AF65-F5344CB8AC3E}">
@@ -865,10 +1035,9 @@
           <a:lstStyle/>
           <a:p>
             <a:r>
-              <a:rPr lang="de-DE" smtClean="0"/>
+              <a:rPr lang="de-DE"/>
               <a:t>Mastertitelformat bearbeiten</a:t>
             </a:r>
-            <a:endParaRPr lang="de-DE"/>
           </a:p>
         </p:txBody>
       </p:sp>
@@ -889,7 +1058,7 @@
           <a:p>
             <a:fld id="{FF5B2BAF-DF38-0A48-A798-0C06E514FD52}" type="datetimeFigureOut">
               <a:rPr lang="de-DE" smtClean="0"/>
-              <a:t>23.02.16</a:t>
+              <a:t>23.07.23</a:t>
             </a:fld>
             <a:endParaRPr lang="de-DE" dirty="0"/>
           </a:p>
@@ -1000,17 +1169,16 @@
           <a:p>
             <a:pPr marL="0" lvl="0" algn="l"/>
             <a:r>
-              <a:rPr lang="de-DE" dirty="0" smtClean="0"/>
+              <a:rPr lang="de-DE" dirty="0"/>
               <a:t>Überschrift </a:t>
             </a:r>
             <a:br>
-              <a:rPr lang="de-DE" dirty="0" smtClean="0"/>
+              <a:rPr lang="de-DE" dirty="0"/>
             </a:br>
             <a:r>
-              <a:rPr lang="de-DE" dirty="0" smtClean="0"/>
+              <a:rPr lang="de-DE" dirty="0"/>
               <a:t>bearbeiten </a:t>
             </a:r>
-            <a:endParaRPr lang="de-DE" dirty="0"/>
           </a:p>
         </p:txBody>
       </p:sp>
@@ -1041,38 +1209,37 @@
           <a:p>
             <a:pPr lvl="0"/>
             <a:r>
-              <a:rPr lang="de-DE" dirty="0" smtClean="0"/>
+              <a:rPr lang="de-DE" dirty="0"/>
               <a:t>Mastertextformat bearbeiten</a:t>
             </a:r>
           </a:p>
           <a:p>
             <a:pPr lvl="1"/>
             <a:r>
-              <a:rPr lang="de-DE" dirty="0" smtClean="0"/>
+              <a:rPr lang="de-DE" dirty="0"/>
               <a:t>Zweite Ebene</a:t>
             </a:r>
           </a:p>
           <a:p>
             <a:pPr lvl="2"/>
             <a:r>
-              <a:rPr lang="de-DE" dirty="0" smtClean="0"/>
+              <a:rPr lang="de-DE" dirty="0"/>
               <a:t>Dritte Ebene</a:t>
             </a:r>
           </a:p>
           <a:p>
             <a:pPr lvl="3"/>
             <a:r>
-              <a:rPr lang="de-DE" dirty="0" smtClean="0"/>
+              <a:rPr lang="de-DE" dirty="0"/>
               <a:t>Vierte Ebene</a:t>
             </a:r>
           </a:p>
           <a:p>
             <a:pPr lvl="4"/>
             <a:r>
-              <a:rPr lang="de-DE" dirty="0" smtClean="0"/>
+              <a:rPr lang="de-DE" dirty="0"/>
               <a:t>Fünfte Ebene</a:t>
             </a:r>
-            <a:endParaRPr lang="de-DE" dirty="0"/>
           </a:p>
         </p:txBody>
       </p:sp>
@@ -1111,7 +1278,7 @@
           <a:p>
             <a:fld id="{FF5B2BAF-DF38-0A48-A798-0C06E514FD52}" type="datetimeFigureOut">
               <a:rPr lang="de-DE" smtClean="0"/>
-              <a:t>23.02.16</a:t>
+              <a:t>23.07.23</a:t>
             </a:fld>
             <a:endParaRPr lang="de-DE" dirty="0"/>
           </a:p>
@@ -1345,7 +1512,7 @@
           <a:lstStyle/>
           <a:p>
             <a:r>
-              <a:rPr lang="de-DE" sz="1050" b="1" dirty="0" smtClean="0">
+              <a:rPr lang="de-DE" sz="1050" b="1" dirty="0">
                 <a:solidFill>
                   <a:schemeClr val="bg1"/>
                 </a:solidFill>
@@ -1355,7 +1522,7 @@
               <a:t>TRAININGSKARTE</a:t>
             </a:r>
             <a:r>
-              <a:rPr lang="de-DE" sz="1050" dirty="0" smtClean="0">
+              <a:rPr lang="de-DE" sz="1050" dirty="0">
                 <a:solidFill>
                   <a:schemeClr val="bg1"/>
                 </a:solidFill>
@@ -1365,7 +1532,7 @@
               <a:t> </a:t>
             </a:r>
             <a:r>
-              <a:rPr lang="de-DE" sz="1050" b="1" dirty="0" smtClean="0">
+              <a:rPr lang="de-DE" sz="1050" b="1" dirty="0">
                 <a:solidFill>
                   <a:schemeClr val="bg1"/>
                 </a:solidFill>
@@ -1374,13 +1541,6 @@
               </a:rPr>
               <a:t>KAN 05</a:t>
             </a:r>
-            <a:endParaRPr lang="de-DE" sz="1050" b="1" dirty="0">
-              <a:solidFill>
-                <a:schemeClr val="bg1"/>
-              </a:solidFill>
-              <a:latin typeface="Avenir Heavy"/>
-              <a:cs typeface="Avenir Heavy"/>
-            </a:endParaRPr>
           </a:p>
         </p:txBody>
       </p:sp>
@@ -1763,17 +1923,16 @@
           <a:lstStyle/>
           <a:p>
             <a:r>
-              <a:rPr lang="de-DE" dirty="0" smtClean="0">
+              <a:rPr lang="de-DE" dirty="0">
                 <a:latin typeface="Avenir Heavy"/>
                 <a:cs typeface="Avenir Heavy"/>
               </a:rPr>
               <a:t>TEMPO</a:t>
             </a:r>
             <a:r>
-              <a:rPr lang="de-DE" dirty="0" smtClean="0"/>
+              <a:rPr lang="de-DE" dirty="0"/>
               <a:t>TABELLE</a:t>
             </a:r>
-            <a:endParaRPr lang="de-DE" dirty="0"/>
           </a:p>
         </p:txBody>
       </p:sp>
@@ -1796,15 +1955,7 @@
           <a:p>
             <a:r>
               <a:rPr lang="de-DE" sz="1100" dirty="0"/>
-              <a:t>Eine Variante des </a:t>
-            </a:r>
-            <a:r>
-              <a:rPr lang="de-DE" sz="1100" dirty="0" err="1"/>
-              <a:t>Kanbanboards</a:t>
-            </a:r>
-            <a:r>
-              <a:rPr lang="de-DE" sz="1100" dirty="0"/>
-              <a:t> für Musiker ist die Tempotabelle.</a:t>
+              <a:t>Eine Variante des Kanban-Boards für Musiker ist die Tempotabelle.</a:t>
             </a:r>
           </a:p>
           <a:p>
@@ -1816,151 +1967,33 @@
           <a:p>
             <a:r>
               <a:rPr lang="de-DE" sz="1100" dirty="0"/>
-              <a:t>Das Tempo könnte für Musiker ein </a:t>
-            </a:r>
-            <a:r>
-              <a:rPr lang="de-DE" sz="1100" dirty="0" smtClean="0"/>
-              <a:t>ähnliches Maß </a:t>
-            </a:r>
+              <a:t>Das Tempo könnte für Musiker ein ähnliches Maß sein, um den Grad der Emanzipation bei bestimmten Phrasen messen zu können.</a:t>
+            </a:r>
+          </a:p>
+          <a:p>
             <a:r>
               <a:rPr lang="de-DE" sz="1100" dirty="0"/>
-              <a:t>sein, um den Grad der Emanzipation </a:t>
-            </a:r>
-            <a:r>
-              <a:rPr lang="de-DE" sz="1100" dirty="0" smtClean="0"/>
-              <a:t>bei </a:t>
-            </a:r>
-            <a:r>
+              <a:t>Mit der Tempotabelle kannst Du dokumentieren, welche Phrase, welches </a:t>
+            </a:r>
+            <a:br>
               <a:rPr lang="de-DE" sz="1100" dirty="0"/>
-              <a:t>bestimmten Phrasen </a:t>
-            </a:r>
-            <a:r>
-              <a:rPr lang="de-DE" sz="1100" dirty="0" smtClean="0"/>
-              <a:t>messen </a:t>
-            </a:r>
+            </a:br>
             <a:r>
               <a:rPr lang="de-DE" sz="1100" dirty="0"/>
-              <a:t>zu können.</a:t>
+              <a:t>Tempostadium erreicht hat.</a:t>
             </a:r>
           </a:p>
           <a:p>
             <a:r>
               <a:rPr lang="de-DE" sz="1100" dirty="0"/>
-              <a:t>Mit der Tempotabelle kannst Du </a:t>
-            </a:r>
-            <a:r>
-              <a:rPr lang="de-DE" sz="1100" dirty="0" smtClean="0"/>
-              <a:t>dokumentieren</a:t>
-            </a:r>
+              <a:t>Schreibe dazu in die erste Spalte die Takte oder Taktstapel, die Du im Tempo steigern möchtest und kreuze das Tempo an, wo Du gerade stehst.</a:t>
+            </a:r>
+          </a:p>
+          <a:p>
             <a:r>
               <a:rPr lang="de-DE" sz="1100" dirty="0"/>
-              <a:t>, welche Phrase, welches </a:t>
-            </a:r>
-            <a:r>
-              <a:rPr lang="de-DE" sz="1100" dirty="0" smtClean="0"/>
-              <a:t/>
-            </a:r>
-            <a:br>
-              <a:rPr lang="de-DE" sz="1100" dirty="0" smtClean="0"/>
-            </a:br>
-            <a:r>
-              <a:rPr lang="de-DE" sz="1100" dirty="0" smtClean="0"/>
-              <a:t>Tempostadium </a:t>
-            </a:r>
-            <a:r>
-              <a:rPr lang="de-DE" sz="1100" dirty="0"/>
-              <a:t>erreicht hat.</a:t>
-            </a:r>
-          </a:p>
-          <a:p>
-            <a:r>
-              <a:rPr lang="de-DE" sz="1100" dirty="0"/>
-              <a:t>Schreibe dazu in die erste Spalte die Takte </a:t>
-            </a:r>
-            <a:r>
-              <a:rPr lang="de-DE" sz="1100" dirty="0" smtClean="0"/>
-              <a:t>oder </a:t>
-            </a:r>
-            <a:r>
-              <a:rPr lang="de-DE" sz="1100" dirty="0" smtClean="0"/>
-              <a:t>Taktstapel</a:t>
-            </a:r>
-            <a:r>
-              <a:rPr lang="de-DE" sz="1100" dirty="0"/>
-              <a:t>, die Du im Tempo steigern </a:t>
-            </a:r>
-            <a:r>
-              <a:rPr lang="de-DE" sz="1100" dirty="0" smtClean="0"/>
-              <a:t>möchtest </a:t>
-            </a:r>
-            <a:r>
-              <a:rPr lang="de-DE" sz="1100" dirty="0"/>
-              <a:t>und </a:t>
-            </a:r>
-            <a:r>
-              <a:rPr lang="de-DE" sz="1100" dirty="0" smtClean="0"/>
-              <a:t>kreuze </a:t>
-            </a:r>
-            <a:r>
-              <a:rPr lang="de-DE" sz="1100" dirty="0"/>
-              <a:t>das Tempo an, wo Du </a:t>
-            </a:r>
-            <a:r>
-              <a:rPr lang="de-DE" sz="1100" dirty="0" smtClean="0"/>
-              <a:t>gerade </a:t>
-            </a:r>
-            <a:r>
-              <a:rPr lang="de-DE" sz="1100" dirty="0"/>
-              <a:t>stehst.</a:t>
-            </a:r>
-          </a:p>
-          <a:p>
-            <a:r>
-              <a:rPr lang="de-DE" sz="1100" dirty="0"/>
-              <a:t>Als Konzertgeschwindigkeit bietet sich ein </a:t>
-            </a:r>
-            <a:r>
-              <a:rPr lang="de-DE" sz="1100" dirty="0" smtClean="0"/>
-              <a:t>10 </a:t>
-            </a:r>
-            <a:r>
-              <a:rPr lang="de-DE" sz="1100" dirty="0"/>
-              <a:t>oder </a:t>
-            </a:r>
-            <a:r>
-              <a:rPr lang="de-DE" sz="1100" dirty="0" smtClean="0"/>
-              <a:t>20%iges </a:t>
-            </a:r>
-            <a:r>
-              <a:rPr lang="de-DE" sz="1100" dirty="0"/>
-              <a:t>Übertreffen der Endgeschwindigkeit an.</a:t>
-            </a:r>
-          </a:p>
-        </p:txBody>
-      </p:sp>
-      <p:sp>
-        <p:nvSpPr>
-          <p:cNvPr id="4" name="Untertitel 3"/>
-          <p:cNvSpPr>
-            <a:spLocks noGrp="1"/>
-          </p:cNvSpPr>
-          <p:nvPr>
-            <p:ph type="subTitle" idx="1"/>
-          </p:nvPr>
-        </p:nvSpPr>
-        <p:spPr/>
-        <p:txBody>
-          <a:bodyPr/>
-          <a:lstStyle/>
-          <a:p>
-            <a:pPr marL="0" indent="0">
-              <a:buNone/>
-            </a:pPr>
-            <a:r>
-              <a:rPr lang="de-DE" dirty="0" smtClean="0"/>
-              <a:t>Regina Brandhuber</a:t>
-            </a:r>
-            <a:endParaRPr lang="de-DE" dirty="0"/>
+              <a:t>Als Konzertgeschwindigkeit bietet sich ein 10 oder 20%iges Übertreffen der Endgeschwindigkeit an.</a:t>
+            </a:r>
           </a:p>
         </p:txBody>
       </p:sp>
@@ -2017,13 +2050,6 @@
   <p:clrMapOvr>
     <a:masterClrMapping/>
   </p:clrMapOvr>
-  <p:timing>
-    <p:tnLst>
-      <p:par>
-        <p:cTn id="1" dur="indefinite" restart="never" nodeType="tmRoot"/>
-      </p:par>
-    </p:tnLst>
-  </p:timing>
 </p:sld>
 </file>
 
@@ -2063,13 +2089,21 @@
           <a:p>
             <a:r>
               <a:rPr lang="de-DE" sz="1200" dirty="0"/>
-              <a:t>Arbeite in mit der Tempotabelle, indem Du in 2 Wochen 4 Phrasen bis zur Konzertgeschwindigkeit bringst.</a:t>
+              <a:t>Arbeite mit der Tempotabelle, indem Du in 2 Wochen 4 Phrasen bis zur Konzertgeschwindigkeit bringst.</a:t>
             </a:r>
           </a:p>
           <a:p>
             <a:r>
               <a:rPr lang="de-DE" sz="1200" dirty="0"/>
-              <a:t>Steigere Dein Tempo wie auf der Tabelle vorgeschlagen in 2er, 3er und dann 4er Schritten. Übe auf einem Tempo so lange, bis in in Dir Langeweile hochkommt und gehe erst dann zur nächsten Tempostufe weiter.</a:t>
+              <a:t>Steigere Dein Tempo wie auf der Tabelle vorgeschlagen in 2er, 3er und dann 4er Schritten. Übe auf einem Tempo so lange, bis Dir </a:t>
+            </a:r>
+            <a:r>
+              <a:rPr lang="de-DE" sz="1200"/>
+              <a:t>langweilig wird </a:t>
+            </a:r>
+            <a:r>
+              <a:rPr lang="de-DE" sz="1200" dirty="0"/>
+              <a:t>und gehe erst dann zur nächsten Tempostufe weiter.</a:t>
             </a:r>
           </a:p>
           <a:p>
@@ -2106,13 +2140,6 @@
   <p:clrMapOvr>
     <a:masterClrMapping/>
   </p:clrMapOvr>
-  <p:timing>
-    <p:tnLst>
-      <p:par>
-        <p:cTn id="1" dur="indefinite" restart="never" nodeType="tmRoot"/>
-      </p:par>
-    </p:tnLst>
-  </p:timing>
 </p:sld>
 </file>
 

</xml_diff>

<commit_message>
KAN 05 Blocksatz und Quelle
</commit_message>
<xml_diff>
--- a/training-cards/music moves/Kanban (KAN)/ger_KAN_05_Tempotabelle_MM_A.pptx
+++ b/training-cards/music moves/Kanban (KAN)/ger_KAN_05_Tempotabelle_MM_A.pptx
@@ -212,7 +212,7 @@
           <a:p>
             <a:fld id="{10F8DC5B-5F6F-B341-A0E1-3C37FC6B86DA}" type="datetimeFigureOut">
               <a:rPr lang="de-DE" smtClean="0"/>
-              <a:t>23.07.23</a:t>
+              <a:t>03.08.24</a:t>
             </a:fld>
             <a:endParaRPr lang="de-DE"/>
           </a:p>
@@ -706,7 +706,7 @@
           </a:ln>
           <a:extLst>
             <a:ext uri="{C572A759-6A51-4108-AA02-DFA0A04FC94B}">
-              <ma14:wrappingTextBoxFlag xmlns="" xmlns:ma14="http://schemas.microsoft.com/office/mac/drawingml/2011/main" val="1"/>
+              <ma14:wrappingTextBoxFlag xmlns:ma14="http://schemas.microsoft.com/office/mac/drawingml/2011/main" xmlns="" val="1"/>
             </a:ext>
           </a:extLst>
         </p:spPr>
@@ -1058,7 +1058,7 @@
           <a:p>
             <a:fld id="{FF5B2BAF-DF38-0A48-A798-0C06E514FD52}" type="datetimeFigureOut">
               <a:rPr lang="de-DE" smtClean="0"/>
-              <a:t>23.07.23</a:t>
+              <a:t>03.08.24</a:t>
             </a:fld>
             <a:endParaRPr lang="de-DE" dirty="0"/>
           </a:p>
@@ -1278,7 +1278,7 @@
           <a:p>
             <a:fld id="{FF5B2BAF-DF38-0A48-A798-0C06E514FD52}" type="datetimeFigureOut">
               <a:rPr lang="de-DE" smtClean="0"/>
-              <a:t>23.07.23</a:t>
+              <a:t>03.08.24</a:t>
             </a:fld>
             <a:endParaRPr lang="de-DE" dirty="0"/>
           </a:p>
@@ -1946,31 +1946,40 @@
             <p:ph idx="13"/>
           </p:nvPr>
         </p:nvSpPr>
-        <p:spPr/>
+        <p:spPr>
+          <a:xfrm>
+            <a:off x="858838" y="1568452"/>
+            <a:ext cx="6235700" cy="3762373"/>
+          </a:xfrm>
+        </p:spPr>
         <p:txBody>
           <a:bodyPr>
             <a:noAutofit/>
           </a:bodyPr>
           <a:lstStyle/>
           <a:p>
+            <a:pPr algn="just"/>
             <a:r>
               <a:rPr lang="de-DE" sz="1100" dirty="0"/>
-              <a:t>Eine Variante des Kanban-Boards für Musiker ist die Tempotabelle.</a:t>
-            </a:r>
-          </a:p>
-          <a:p>
+              <a:t>Eine Variante des Kanban-Boards angewandt (vgl. Anderson 2011) für Musiker ist die Tempotabelle.</a:t>
+            </a:r>
+          </a:p>
+          <a:p>
+            <a:pPr algn="just"/>
             <a:r>
               <a:rPr lang="de-DE" sz="1100" dirty="0"/>
               <a:t>In der Softwareentwicklung gibt es nach der Programmierung einen Arbeitsschritt, der "Testen" heißt. Hier wird die Software auf Herz und Nieren geprüft und auftretende Fehler werden dokumentiert, damit die Software dementsprechend überarbeitet werden kann.</a:t>
             </a:r>
           </a:p>
           <a:p>
+            <a:pPr algn="just"/>
             <a:r>
               <a:rPr lang="de-DE" sz="1100" dirty="0"/>
               <a:t>Das Tempo könnte für Musiker ein ähnliches Maß sein, um den Grad der Emanzipation bei bestimmten Phrasen messen zu können.</a:t>
             </a:r>
           </a:p>
           <a:p>
+            <a:pPr algn="just"/>
             <a:r>
               <a:rPr lang="de-DE" sz="1100" dirty="0"/>
               <a:t>Mit der Tempotabelle kannst Du dokumentieren, welche Phrase, welches </a:t>
@@ -1984,16 +1993,78 @@
             </a:r>
           </a:p>
           <a:p>
+            <a:pPr algn="just"/>
             <a:r>
               <a:rPr lang="de-DE" sz="1100" dirty="0"/>
-              <a:t>Schreibe dazu in die erste Spalte die Takte oder Taktstapel, die Du im Tempo steigern möchtest und kreuze das Tempo an, wo Du gerade stehst.</a:t>
-            </a:r>
-          </a:p>
-          <a:p>
+              <a:t>Schreibe dazu in die erste Spalte die Takte oder Taktstapel, die Du im Tempo steigern möchtest, und kreuze das Tempo an, wo Du gerade stehst.</a:t>
+            </a:r>
+          </a:p>
+          <a:p>
+            <a:pPr algn="just"/>
             <a:r>
               <a:rPr lang="de-DE" sz="1100" dirty="0"/>
               <a:t>Als Konzertgeschwindigkeit bietet sich ein 10 oder 20%iges Übertreffen der Endgeschwindigkeit an.</a:t>
             </a:r>
+          </a:p>
+          <a:p>
+            <a:pPr marL="0" indent="0" algn="just">
+              <a:buNone/>
+            </a:pPr>
+            <a:endParaRPr lang="de-DE" sz="1100" b="1" dirty="0"/>
+          </a:p>
+          <a:p>
+            <a:pPr marL="0" indent="0" algn="just">
+              <a:buNone/>
+            </a:pPr>
+            <a:endParaRPr lang="de-DE" sz="1100" b="1" dirty="0"/>
+          </a:p>
+          <a:p>
+            <a:pPr marL="0" indent="0" algn="just">
+              <a:buNone/>
+            </a:pPr>
+            <a:endParaRPr lang="de-DE" sz="1100" b="1" dirty="0"/>
+          </a:p>
+          <a:p>
+            <a:pPr marL="0" indent="0" algn="just">
+              <a:buNone/>
+            </a:pPr>
+            <a:endParaRPr lang="de-DE" sz="1100" b="1" dirty="0"/>
+          </a:p>
+          <a:p>
+            <a:pPr marL="0" indent="0" algn="just">
+              <a:buNone/>
+            </a:pPr>
+            <a:endParaRPr lang="de-DE" sz="800" b="1" dirty="0"/>
+          </a:p>
+          <a:p>
+            <a:pPr marL="0" indent="0" algn="just">
+              <a:buNone/>
+            </a:pPr>
+            <a:endParaRPr lang="de-DE" sz="500" b="1" dirty="0"/>
+          </a:p>
+          <a:p>
+            <a:pPr marL="0" indent="0" algn="just">
+              <a:buNone/>
+            </a:pPr>
+            <a:r>
+              <a:rPr lang="de-DE" sz="800" b="1" dirty="0"/>
+              <a:t>Quelle: Anderson</a:t>
+            </a:r>
+            <a:r>
+              <a:rPr lang="de-DE" sz="800" dirty="0"/>
+              <a:t>, David J. (2011): Kanban. Evolutionäres Change Management für IT-Organisationen. Heidelberg: </a:t>
+            </a:r>
+            <a:r>
+              <a:rPr lang="de-DE" sz="800" dirty="0" err="1"/>
+              <a:t>dpunkt.verlag</a:t>
+            </a:r>
+            <a:endParaRPr lang="de-DE" sz="800" dirty="0"/>
+          </a:p>
+          <a:p>
+            <a:pPr marL="0" indent="0" algn="just">
+              <a:buNone/>
+            </a:pPr>
+            <a:endParaRPr lang="de-DE" sz="1100" dirty="0"/>
           </a:p>
         </p:txBody>
       </p:sp>
@@ -2080,33 +2151,33 @@
             <p:ph idx="1"/>
           </p:nvPr>
         </p:nvSpPr>
-        <p:spPr/>
+        <p:spPr>
+          <a:xfrm>
+            <a:off x="858838" y="1555750"/>
+            <a:ext cx="6287397" cy="3133835"/>
+          </a:xfrm>
+        </p:spPr>
         <p:txBody>
           <a:bodyPr>
             <a:normAutofit/>
           </a:bodyPr>
           <a:lstStyle/>
           <a:p>
+            <a:pPr algn="just"/>
             <a:r>
               <a:rPr lang="de-DE" sz="1200" dirty="0"/>
               <a:t>Arbeite mit der Tempotabelle, indem Du in 2 Wochen 4 Phrasen bis zur Konzertgeschwindigkeit bringst.</a:t>
             </a:r>
           </a:p>
           <a:p>
+            <a:pPr algn="just"/>
             <a:r>
               <a:rPr lang="de-DE" sz="1200" dirty="0"/>
-              <a:t>Steigere Dein Tempo wie auf der Tabelle vorgeschlagen in 2er, 3er und dann 4er Schritten. Übe auf einem Tempo so lange, bis Dir </a:t>
-            </a:r>
-            <a:r>
-              <a:rPr lang="de-DE" sz="1200"/>
-              <a:t>langweilig wird </a:t>
-            </a:r>
-            <a:r>
-              <a:rPr lang="de-DE" sz="1200" dirty="0"/>
-              <a:t>und gehe erst dann zur nächsten Tempostufe weiter.</a:t>
-            </a:r>
-          </a:p>
-          <a:p>
+              <a:t>Steigere Dein Tempo wie auf der Tabelle vorgeschlagen in 2er, 3er und dann 4er Schritten. Übe auf einem Tempo so lange, bis Dir langweilig wird und gehe erst dann zur nächsten Tempostufe weiter.</a:t>
+            </a:r>
+          </a:p>
+          <a:p>
+            <a:pPr algn="just"/>
             <a:r>
               <a:rPr lang="de-DE" sz="1200" dirty="0"/>
               <a:t>Zeige Deinem Team Deine ausgefüllte(</a:t>

</xml_diff>

<commit_message>
KAN 04 und 05 Autorin hinzugefügt
PDF und PP
</commit_message>
<xml_diff>
--- a/training-cards/music moves/Kanban (KAN)/ger_KAN_05_Tempotabelle_MM_A.pptx
+++ b/training-cards/music moves/Kanban (KAN)/ger_KAN_05_Tempotabelle_MM_A.pptx
@@ -212,7 +212,7 @@
           <a:p>
             <a:fld id="{10F8DC5B-5F6F-B341-A0E1-3C37FC6B86DA}" type="datetimeFigureOut">
               <a:rPr lang="de-DE" smtClean="0"/>
-              <a:t>03.08.24</a:t>
+              <a:t>08.03.25</a:t>
             </a:fld>
             <a:endParaRPr lang="de-DE"/>
           </a:p>
@@ -706,7 +706,7 @@
           </a:ln>
           <a:extLst>
             <a:ext uri="{C572A759-6A51-4108-AA02-DFA0A04FC94B}">
-              <ma14:wrappingTextBoxFlag xmlns:ma14="http://schemas.microsoft.com/office/mac/drawingml/2011/main" xmlns="" val="1"/>
+              <ma14:wrappingTextBoxFlag xmlns="" xmlns:ma14="http://schemas.microsoft.com/office/mac/drawingml/2011/main" val="1"/>
             </a:ext>
           </a:extLst>
         </p:spPr>
@@ -1058,7 +1058,7 @@
           <a:p>
             <a:fld id="{FF5B2BAF-DF38-0A48-A798-0C06E514FD52}" type="datetimeFigureOut">
               <a:rPr lang="de-DE" smtClean="0"/>
-              <a:t>03.08.24</a:t>
+              <a:t>08.03.25</a:t>
             </a:fld>
             <a:endParaRPr lang="de-DE" dirty="0"/>
           </a:p>
@@ -1278,7 +1278,7 @@
           <a:p>
             <a:fld id="{FF5B2BAF-DF38-0A48-A798-0C06E514FD52}" type="datetimeFigureOut">
               <a:rPr lang="de-DE" smtClean="0"/>
-              <a:t>03.08.24</a:t>
+              <a:t>08.03.25</a:t>
             </a:fld>
             <a:endParaRPr lang="de-DE" dirty="0"/>
           </a:p>
@@ -2111,6 +2111,42 @@
           <a:effectLst/>
         </p:spPr>
       </p:pic>
+      <p:sp>
+        <p:nvSpPr>
+          <p:cNvPr id="4" name="Untertitel 3">
+            <a:extLst>
+              <a:ext uri="{FF2B5EF4-FFF2-40B4-BE49-F238E27FC236}">
+                <a16:creationId xmlns:a16="http://schemas.microsoft.com/office/drawing/2014/main" id="{A1D57FE9-519B-215F-B45D-7B2A5D04165E}"/>
+              </a:ext>
+            </a:extLst>
+          </p:cNvPr>
+          <p:cNvSpPr>
+            <a:spLocks noGrp="1"/>
+          </p:cNvSpPr>
+          <p:nvPr>
+            <p:ph type="subTitle" idx="1"/>
+          </p:nvPr>
+        </p:nvSpPr>
+        <p:spPr>
+          <a:xfrm>
+            <a:off x="1192733" y="1088690"/>
+            <a:ext cx="5293995" cy="467477"/>
+          </a:xfrm>
+        </p:spPr>
+        <p:txBody>
+          <a:bodyPr/>
+          <a:lstStyle/>
+          <a:p>
+            <a:pPr marL="0" indent="0">
+              <a:buNone/>
+            </a:pPr>
+            <a:r>
+              <a:rPr lang="de-DE" dirty="0"/>
+              <a:t>Regina Brandhuber</a:t>
+            </a:r>
+          </a:p>
+        </p:txBody>
+      </p:sp>
     </p:spTree>
     <p:extLst>
       <p:ext uri="{BB962C8B-B14F-4D97-AF65-F5344CB8AC3E}">

</xml_diff>